<commit_message>
Small code edit for revision
</commit_message>
<xml_diff>
--- a/figures/Figure2.pptx
+++ b/figures/Figure2.pptx
@@ -244,7 +244,7 @@
           <a:p>
             <a:fld id="{A198C7A8-F79D-4175-B575-7277BDCA6D30}" type="datetimeFigureOut">
               <a:rPr lang="en-GB" smtClean="0"/>
-              <a:t>27/06/2023</a:t>
+              <a:t>17/10/2023</a:t>
             </a:fld>
             <a:endParaRPr lang="en-GB"/>
           </a:p>
@@ -414,7 +414,7 @@
           <a:p>
             <a:fld id="{A198C7A8-F79D-4175-B575-7277BDCA6D30}" type="datetimeFigureOut">
               <a:rPr lang="en-GB" smtClean="0"/>
-              <a:t>27/06/2023</a:t>
+              <a:t>17/10/2023</a:t>
             </a:fld>
             <a:endParaRPr lang="en-GB"/>
           </a:p>
@@ -594,7 +594,7 @@
           <a:p>
             <a:fld id="{A198C7A8-F79D-4175-B575-7277BDCA6D30}" type="datetimeFigureOut">
               <a:rPr lang="en-GB" smtClean="0"/>
-              <a:t>27/06/2023</a:t>
+              <a:t>17/10/2023</a:t>
             </a:fld>
             <a:endParaRPr lang="en-GB"/>
           </a:p>
@@ -764,7 +764,7 @@
           <a:p>
             <a:fld id="{A198C7A8-F79D-4175-B575-7277BDCA6D30}" type="datetimeFigureOut">
               <a:rPr lang="en-GB" smtClean="0"/>
-              <a:t>27/06/2023</a:t>
+              <a:t>17/10/2023</a:t>
             </a:fld>
             <a:endParaRPr lang="en-GB"/>
           </a:p>
@@ -1008,7 +1008,7 @@
           <a:p>
             <a:fld id="{A198C7A8-F79D-4175-B575-7277BDCA6D30}" type="datetimeFigureOut">
               <a:rPr lang="en-GB" smtClean="0"/>
-              <a:t>27/06/2023</a:t>
+              <a:t>17/10/2023</a:t>
             </a:fld>
             <a:endParaRPr lang="en-GB"/>
           </a:p>
@@ -1240,7 +1240,7 @@
           <a:p>
             <a:fld id="{A198C7A8-F79D-4175-B575-7277BDCA6D30}" type="datetimeFigureOut">
               <a:rPr lang="en-GB" smtClean="0"/>
-              <a:t>27/06/2023</a:t>
+              <a:t>17/10/2023</a:t>
             </a:fld>
             <a:endParaRPr lang="en-GB"/>
           </a:p>
@@ -1607,7 +1607,7 @@
           <a:p>
             <a:fld id="{A198C7A8-F79D-4175-B575-7277BDCA6D30}" type="datetimeFigureOut">
               <a:rPr lang="en-GB" smtClean="0"/>
-              <a:t>27/06/2023</a:t>
+              <a:t>17/10/2023</a:t>
             </a:fld>
             <a:endParaRPr lang="en-GB"/>
           </a:p>
@@ -1725,7 +1725,7 @@
           <a:p>
             <a:fld id="{A198C7A8-F79D-4175-B575-7277BDCA6D30}" type="datetimeFigureOut">
               <a:rPr lang="en-GB" smtClean="0"/>
-              <a:t>27/06/2023</a:t>
+              <a:t>17/10/2023</a:t>
             </a:fld>
             <a:endParaRPr lang="en-GB"/>
           </a:p>
@@ -1820,7 +1820,7 @@
           <a:p>
             <a:fld id="{A198C7A8-F79D-4175-B575-7277BDCA6D30}" type="datetimeFigureOut">
               <a:rPr lang="en-GB" smtClean="0"/>
-              <a:t>27/06/2023</a:t>
+              <a:t>17/10/2023</a:t>
             </a:fld>
             <a:endParaRPr lang="en-GB"/>
           </a:p>
@@ -2097,7 +2097,7 @@
           <a:p>
             <a:fld id="{A198C7A8-F79D-4175-B575-7277BDCA6D30}" type="datetimeFigureOut">
               <a:rPr lang="en-GB" smtClean="0"/>
-              <a:t>27/06/2023</a:t>
+              <a:t>17/10/2023</a:t>
             </a:fld>
             <a:endParaRPr lang="en-GB"/>
           </a:p>
@@ -2354,7 +2354,7 @@
           <a:p>
             <a:fld id="{A198C7A8-F79D-4175-B575-7277BDCA6D30}" type="datetimeFigureOut">
               <a:rPr lang="en-GB" smtClean="0"/>
-              <a:t>27/06/2023</a:t>
+              <a:t>17/10/2023</a:t>
             </a:fld>
             <a:endParaRPr lang="en-GB"/>
           </a:p>
@@ -2567,7 +2567,7 @@
           <a:p>
             <a:fld id="{A198C7A8-F79D-4175-B575-7277BDCA6D30}" type="datetimeFigureOut">
               <a:rPr lang="en-GB" smtClean="0"/>
-              <a:t>27/06/2023</a:t>
+              <a:t>17/10/2023</a:t>
             </a:fld>
             <a:endParaRPr lang="en-GB"/>
           </a:p>
@@ -2986,7 +2986,7 @@
           </p:cNvPicPr>
           <p:nvPr/>
         </p:nvPicPr>
-        <p:blipFill rotWithShape="1">
+        <p:blipFill>
           <a:blip r:embed="rId2">
             <a:extLst>
               <a:ext uri="{28A0092B-C50C-407E-A947-70E740481C1C}">
@@ -2994,7 +2994,7 @@
               </a:ext>
             </a:extLst>
           </a:blip>
-          <a:srcRect l="11161" r="11448"/>
+          <a:srcRect l="11336" r="11336"/>
           <a:stretch/>
         </p:blipFill>
         <p:spPr>

</xml_diff>